<commit_message>
A last flurry before Lab2 starts
</commit_message>
<xml_diff>
--- a/Wk2_RStudioGitHubC2/G920_F18_Lab2_GitHub_Git_R_RStudio.pptx
+++ b/Wk2_RStudioGitHubC2/G920_F18_Lab2_GitHub_Git_R_RStudio.pptx
@@ -5,16 +5,18 @@
     <p:sldMasterId id="2147483648" r:id="rId1"/>
   </p:sldMasterIdLst>
   <p:notesMasterIdLst>
-    <p:notesMasterId r:id="rId6"/>
+    <p:notesMasterId r:id="rId8"/>
   </p:notesMasterIdLst>
   <p:handoutMasterIdLst>
-    <p:handoutMasterId r:id="rId7"/>
+    <p:handoutMasterId r:id="rId9"/>
   </p:handoutMasterIdLst>
   <p:sldIdLst>
     <p:sldId id="508" r:id="rId2"/>
     <p:sldId id="509" r:id="rId3"/>
     <p:sldId id="510" r:id="rId4"/>
     <p:sldId id="511" r:id="rId5"/>
+    <p:sldId id="513" r:id="rId6"/>
+    <p:sldId id="514" r:id="rId7"/>
   </p:sldIdLst>
   <p:sldSz cx="9144000" cy="6858000" type="screen4x3"/>
   <p:notesSz cx="9144000" cy="6858000"/>
@@ -4214,15 +4216,7 @@
             </a:r>
             <a:r>
               <a:rPr lang="en-US" sz="4000" dirty="0" smtClean="0"/>
-              <a:t>, </a:t>
-            </a:r>
-            <a:r>
-              <a:rPr lang="en-US" sz="4000" dirty="0" smtClean="0"/>
-              <a:t>R</a:t>
-            </a:r>
-            <a:r>
-              <a:rPr lang="en-US" sz="4000" dirty="0" smtClean="0"/>
-              <a:t>, </a:t>
+              <a:t>, R, </a:t>
             </a:r>
             <a:r>
               <a:rPr lang="en-US" sz="4000" dirty="0" err="1" smtClean="0"/>
@@ -4269,7 +4263,6 @@
               <a:rPr lang="en-US" b="1" dirty="0" smtClean="0"/>
               <a:t>Lesson Goals </a:t>
             </a:r>
-            <a:endParaRPr lang="en-US" b="1" dirty="0" smtClean="0"/>
           </a:p>
           <a:p>
             <a:pPr marL="342900" indent="-342900">
@@ -4278,8 +4271,13 @@
             </a:pPr>
             <a:r>
               <a:rPr lang="en-US" dirty="0" smtClean="0"/>
-              <a:t>Introduce you to GitHub, terminology, capabilities</a:t>
-            </a:r>
+              <a:t>Introduce you to GitHub, terminology, </a:t>
+            </a:r>
+            <a:r>
+              <a:rPr lang="en-US" dirty="0" smtClean="0"/>
+              <a:t>capabilities</a:t>
+            </a:r>
+            <a:endParaRPr lang="en-US" dirty="0" smtClean="0"/>
           </a:p>
           <a:p>
             <a:pPr marL="342900" indent="-342900">
@@ -4288,11 +4286,11 @@
             </a:pPr>
             <a:r>
               <a:rPr lang="en-US" dirty="0" smtClean="0"/>
-              <a:t>Introduce </a:t>
+              <a:t>Introduce you to </a:t>
             </a:r>
             <a:r>
               <a:rPr lang="en-US" dirty="0" smtClean="0"/>
-              <a:t>you to </a:t>
+              <a:t>Atom &amp; </a:t>
             </a:r>
             <a:r>
               <a:rPr lang="en-US" dirty="0" err="1" smtClean="0"/>
@@ -4300,11 +4298,7 @@
             </a:r>
             <a:r>
               <a:rPr lang="en-US" dirty="0" smtClean="0"/>
-              <a:t>, troubleshoot, </a:t>
-            </a:r>
-            <a:r>
-              <a:rPr lang="en-US" dirty="0" smtClean="0"/>
-              <a:t>basic operations (clone, pull/commit/push, fork)</a:t>
+              <a:t>, troubleshoot, basic operations (clone, pull/commit/push, fork)</a:t>
             </a:r>
           </a:p>
           <a:p>
@@ -4352,8 +4346,12 @@
               <a:buChar char="•"/>
             </a:pPr>
             <a:r>
+              <a:rPr lang="en-US" u="sng" dirty="0" smtClean="0"/>
+              <a:t>GitHub</a:t>
+            </a:r>
+            <a:r>
               <a:rPr lang="en-US" dirty="0" smtClean="0"/>
-              <a:t>GitHub:  Fork the class repository</a:t>
+              <a:t>:  Fork the class repository</a:t>
             </a:r>
           </a:p>
           <a:p>
@@ -4362,7 +4360,7 @@
               <a:buChar char="•"/>
             </a:pPr>
             <a:r>
-              <a:rPr lang="en-US" dirty="0" err="1" smtClean="0"/>
+              <a:rPr lang="en-US" u="sng" dirty="0" err="1" smtClean="0"/>
               <a:t>Git</a:t>
             </a:r>
             <a:r>
@@ -4396,8 +4394,12 @@
               <a:buChar char="•"/>
             </a:pPr>
             <a:r>
+              <a:rPr lang="en-US" u="sng" dirty="0" smtClean="0"/>
+              <a:t>R</a:t>
+            </a:r>
+            <a:r>
               <a:rPr lang="en-US" dirty="0" smtClean="0"/>
-              <a:t>R: </a:t>
+              <a:t>: </a:t>
             </a:r>
           </a:p>
           <a:p>
@@ -4433,7 +4435,6 @@
               <a:rPr lang="en-US" i="1" dirty="0" smtClean="0"/>
               <a:t>rioja</a:t>
             </a:r>
-            <a:endParaRPr lang="en-US" i="1" dirty="0" smtClean="0"/>
           </a:p>
           <a:p>
             <a:endParaRPr lang="en-US" dirty="0"/>
@@ -5096,14 +5097,14 @@
           </a:p>
           <a:p>
             <a:r>
-              <a:rPr lang="en-US" sz="2200">
+              <a:rPr lang="en-US" sz="2200" dirty="0">
                 <a:latin typeface="Courier New" panose="02070309020205020404" pitchFamily="49" charset="0"/>
                 <a:cs typeface="Courier New" panose="02070309020205020404" pitchFamily="49" charset="0"/>
               </a:rPr>
               <a:t>	</a:t>
             </a:r>
             <a:r>
-              <a:rPr lang="en-US" sz="2200" smtClean="0">
+              <a:rPr lang="en-US" sz="2200" dirty="0" smtClean="0">
                 <a:latin typeface="Courier New" panose="02070309020205020404" pitchFamily="49" charset="0"/>
                 <a:cs typeface="Courier New" panose="02070309020205020404" pitchFamily="49" charset="0"/>
               </a:rPr>
@@ -5123,6 +5124,376 @@
     <p:extLst>
       <p:ext uri="{BB962C8B-B14F-4D97-AF65-F5344CB8AC3E}">
         <p14:creationId xmlns:p14="http://schemas.microsoft.com/office/powerpoint/2010/main" val="1849318023"/>
+      </p:ext>
+    </p:extLst>
+  </p:cSld>
+  <p:clrMapOvr>
+    <a:masterClrMapping/>
+  </p:clrMapOvr>
+</p:sld>
+</file>
+
+<file path=ppt/slides/slide5.xml><?xml version="1.0" encoding="utf-8"?>
+<p:sld xmlns:a="http://schemas.openxmlformats.org/drawingml/2006/main" xmlns:r="http://schemas.openxmlformats.org/officeDocument/2006/relationships" xmlns:p="http://schemas.openxmlformats.org/presentationml/2006/main">
+  <p:cSld>
+    <p:spTree>
+      <p:nvGrpSpPr>
+        <p:cNvPr id="1" name=""/>
+        <p:cNvGrpSpPr/>
+        <p:nvPr/>
+      </p:nvGrpSpPr>
+      <p:grpSpPr>
+        <a:xfrm>
+          <a:off x="0" y="0"/>
+          <a:ext cx="0" cy="0"/>
+          <a:chOff x="0" y="0"/>
+          <a:chExt cx="0" cy="0"/>
+        </a:xfrm>
+      </p:grpSpPr>
+      <p:sp>
+        <p:nvSpPr>
+          <p:cNvPr id="2" name="Title 1"/>
+          <p:cNvSpPr>
+            <a:spLocks noGrp="1"/>
+          </p:cNvSpPr>
+          <p:nvPr>
+            <p:ph type="ctrTitle"/>
+          </p:nvPr>
+        </p:nvSpPr>
+        <p:spPr/>
+        <p:txBody>
+          <a:bodyPr/>
+          <a:lstStyle/>
+          <a:p>
+            <a:r>
+              <a:rPr lang="en-US" dirty="0" err="1" smtClean="0"/>
+              <a:t>Git</a:t>
+            </a:r>
+            <a:endParaRPr lang="en-US" dirty="0"/>
+          </a:p>
+        </p:txBody>
+      </p:sp>
+      <p:sp>
+        <p:nvSpPr>
+          <p:cNvPr id="3" name="TextBox 2"/>
+          <p:cNvSpPr txBox="1"/>
+          <p:nvPr/>
+        </p:nvSpPr>
+        <p:spPr>
+          <a:xfrm>
+            <a:off x="0" y="1057836"/>
+            <a:ext cx="5003293" cy="1877437"/>
+          </a:xfrm>
+          <a:prstGeom prst="rect">
+            <a:avLst/>
+          </a:prstGeom>
+          <a:noFill/>
+        </p:spPr>
+        <p:txBody>
+          <a:bodyPr wrap="none" rtlCol="0">
+            <a:spAutoFit/>
+          </a:bodyPr>
+          <a:lstStyle/>
+          <a:p>
+            <a:r>
+              <a:rPr lang="en-US" b="1" dirty="0" smtClean="0"/>
+              <a:t>Making and Committing changes</a:t>
+            </a:r>
+            <a:endParaRPr lang="en-US" dirty="0" smtClean="0"/>
+          </a:p>
+          <a:p>
+            <a:endParaRPr lang="en-US" dirty="0"/>
+          </a:p>
+          <a:p>
+            <a:pPr marL="342900" indent="-342900">
+              <a:buFont typeface="Arial" panose="020B0604020202020204" pitchFamily="34" charset="0"/>
+              <a:buChar char="•"/>
+            </a:pPr>
+            <a:r>
+              <a:rPr lang="en-US" dirty="0" err="1">
+                <a:latin typeface="Courier New" panose="02070309020205020404" pitchFamily="49" charset="0"/>
+                <a:cs typeface="Courier New" panose="02070309020205020404" pitchFamily="49" charset="0"/>
+              </a:rPr>
+              <a:t>git</a:t>
+            </a:r>
+            <a:r>
+              <a:rPr lang="en-US" dirty="0">
+                <a:latin typeface="Courier New" panose="02070309020205020404" pitchFamily="49" charset="0"/>
+                <a:cs typeface="Courier New" panose="02070309020205020404" pitchFamily="49" charset="0"/>
+              </a:rPr>
+              <a:t> add --all </a:t>
+            </a:r>
+            <a:endParaRPr lang="en-US" dirty="0" smtClean="0">
+              <a:latin typeface="Courier New" panose="02070309020205020404" pitchFamily="49" charset="0"/>
+              <a:cs typeface="Courier New" panose="02070309020205020404" pitchFamily="49" charset="0"/>
+            </a:endParaRPr>
+          </a:p>
+          <a:p>
+            <a:pPr marL="342900" indent="-342900">
+              <a:buFont typeface="Arial" panose="020B0604020202020204" pitchFamily="34" charset="0"/>
+              <a:buChar char="•"/>
+            </a:pPr>
+            <a:r>
+              <a:rPr lang="en-US" sz="2200" dirty="0" err="1">
+                <a:latin typeface="Courier New" panose="02070309020205020404" pitchFamily="49" charset="0"/>
+                <a:cs typeface="Courier New" panose="02070309020205020404" pitchFamily="49" charset="0"/>
+              </a:rPr>
+              <a:t>git</a:t>
+            </a:r>
+            <a:r>
+              <a:rPr lang="en-US" sz="2200" dirty="0">
+                <a:latin typeface="Courier New" panose="02070309020205020404" pitchFamily="49" charset="0"/>
+                <a:cs typeface="Courier New" panose="02070309020205020404" pitchFamily="49" charset="0"/>
+              </a:rPr>
+              <a:t> commit -m “XXMESSAGE</a:t>
+            </a:r>
+            <a:r>
+              <a:rPr lang="en-US" sz="2200" dirty="0" smtClean="0">
+                <a:latin typeface="Courier New" panose="02070309020205020404" pitchFamily="49" charset="0"/>
+                <a:cs typeface="Courier New" panose="02070309020205020404" pitchFamily="49" charset="0"/>
+              </a:rPr>
+              <a:t>”</a:t>
+            </a:r>
+          </a:p>
+          <a:p>
+            <a:pPr marL="342900" indent="-342900">
+              <a:buFont typeface="Arial" panose="020B0604020202020204" pitchFamily="34" charset="0"/>
+              <a:buChar char="•"/>
+            </a:pPr>
+            <a:r>
+              <a:rPr lang="en-US" sz="2200" dirty="0" err="1">
+                <a:latin typeface="Courier New" panose="02070309020205020404" pitchFamily="49" charset="0"/>
+                <a:cs typeface="Courier New" panose="02070309020205020404" pitchFamily="49" charset="0"/>
+              </a:rPr>
+              <a:t>git</a:t>
+            </a:r>
+            <a:r>
+              <a:rPr lang="en-US" sz="2200" dirty="0">
+                <a:latin typeface="Courier New" panose="02070309020205020404" pitchFamily="49" charset="0"/>
+                <a:cs typeface="Courier New" panose="02070309020205020404" pitchFamily="49" charset="0"/>
+              </a:rPr>
+              <a:t> push origin </a:t>
+            </a:r>
+            <a:r>
+              <a:rPr lang="en-US" sz="2200" dirty="0" smtClean="0">
+                <a:latin typeface="Courier New" panose="02070309020205020404" pitchFamily="49" charset="0"/>
+                <a:cs typeface="Courier New" panose="02070309020205020404" pitchFamily="49" charset="0"/>
+              </a:rPr>
+              <a:t>master</a:t>
+            </a:r>
+          </a:p>
+        </p:txBody>
+      </p:sp>
+    </p:spTree>
+    <p:extLst>
+      <p:ext uri="{BB962C8B-B14F-4D97-AF65-F5344CB8AC3E}">
+        <p14:creationId xmlns:p14="http://schemas.microsoft.com/office/powerpoint/2010/main" val="412301085"/>
+      </p:ext>
+    </p:extLst>
+  </p:cSld>
+  <p:clrMapOvr>
+    <a:masterClrMapping/>
+  </p:clrMapOvr>
+</p:sld>
+</file>
+
+<file path=ppt/slides/slide6.xml><?xml version="1.0" encoding="utf-8"?>
+<p:sld xmlns:a="http://schemas.openxmlformats.org/drawingml/2006/main" xmlns:r="http://schemas.openxmlformats.org/officeDocument/2006/relationships" xmlns:p="http://schemas.openxmlformats.org/presentationml/2006/main">
+  <p:cSld>
+    <p:spTree>
+      <p:nvGrpSpPr>
+        <p:cNvPr id="1" name=""/>
+        <p:cNvGrpSpPr/>
+        <p:nvPr/>
+      </p:nvGrpSpPr>
+      <p:grpSpPr>
+        <a:xfrm>
+          <a:off x="0" y="0"/>
+          <a:ext cx="0" cy="0"/>
+          <a:chOff x="0" y="0"/>
+          <a:chExt cx="0" cy="0"/>
+        </a:xfrm>
+      </p:grpSpPr>
+      <p:sp>
+        <p:nvSpPr>
+          <p:cNvPr id="2" name="Title 1"/>
+          <p:cNvSpPr>
+            <a:spLocks noGrp="1"/>
+          </p:cNvSpPr>
+          <p:nvPr>
+            <p:ph type="ctrTitle"/>
+          </p:nvPr>
+        </p:nvSpPr>
+        <p:spPr/>
+        <p:txBody>
+          <a:bodyPr/>
+          <a:lstStyle/>
+          <a:p>
+            <a:r>
+              <a:rPr lang="en-US" dirty="0" smtClean="0"/>
+              <a:t>R/</a:t>
+            </a:r>
+            <a:r>
+              <a:rPr lang="en-US" dirty="0" err="1" smtClean="0"/>
+              <a:t>RStudio</a:t>
+            </a:r>
+            <a:r>
+              <a:rPr lang="en-US" dirty="0" smtClean="0"/>
+              <a:t>:  Make a Pollen Diagram</a:t>
+            </a:r>
+            <a:endParaRPr lang="en-US" dirty="0"/>
+          </a:p>
+        </p:txBody>
+      </p:sp>
+      <p:sp>
+        <p:nvSpPr>
+          <p:cNvPr id="3" name="TextBox 2"/>
+          <p:cNvSpPr txBox="1"/>
+          <p:nvPr/>
+        </p:nvSpPr>
+        <p:spPr>
+          <a:xfrm>
+            <a:off x="412376" y="874286"/>
+            <a:ext cx="8731623" cy="6001643"/>
+          </a:xfrm>
+          <a:prstGeom prst="rect">
+            <a:avLst/>
+          </a:prstGeom>
+          <a:noFill/>
+        </p:spPr>
+        <p:txBody>
+          <a:bodyPr wrap="square" rtlCol="0">
+            <a:spAutoFit/>
+          </a:bodyPr>
+          <a:lstStyle/>
+          <a:p>
+            <a:pPr marL="457200" indent="-457200">
+              <a:buFont typeface="Arial" panose="020B0604020202020204" pitchFamily="34" charset="0"/>
+              <a:buChar char="•"/>
+            </a:pPr>
+            <a:r>
+              <a:rPr lang="en-US" sz="3200" dirty="0" smtClean="0"/>
+              <a:t>Download a CSV </a:t>
+            </a:r>
+            <a:r>
+              <a:rPr lang="en-US" sz="3200" dirty="0" err="1" smtClean="0"/>
+              <a:t>datafile</a:t>
+            </a:r>
+            <a:r>
+              <a:rPr lang="en-US" sz="3200" dirty="0" smtClean="0"/>
+              <a:t> from Neotoma</a:t>
+            </a:r>
+          </a:p>
+          <a:p>
+            <a:pPr marL="457200" indent="-457200">
+              <a:buFont typeface="Arial" panose="020B0604020202020204" pitchFamily="34" charset="0"/>
+              <a:buChar char="•"/>
+            </a:pPr>
+            <a:endParaRPr lang="en-US" sz="3200" dirty="0"/>
+          </a:p>
+          <a:p>
+            <a:pPr marL="457200" indent="-457200">
+              <a:buFont typeface="Arial" panose="020B0604020202020204" pitchFamily="34" charset="0"/>
+              <a:buChar char="•"/>
+            </a:pPr>
+            <a:r>
+              <a:rPr lang="en-US" sz="3200" dirty="0" smtClean="0"/>
+              <a:t>Import it into R (</a:t>
+            </a:r>
+            <a:r>
+              <a:rPr lang="en-US" sz="3200" dirty="0" smtClean="0">
+                <a:latin typeface="Courier New" panose="02070309020205020404" pitchFamily="49" charset="0"/>
+                <a:cs typeface="Courier New" panose="02070309020205020404" pitchFamily="49" charset="0"/>
+              </a:rPr>
+              <a:t>read.csv</a:t>
+            </a:r>
+            <a:r>
+              <a:rPr lang="en-US" sz="3200" dirty="0" smtClean="0"/>
+              <a:t>)</a:t>
+            </a:r>
+          </a:p>
+          <a:p>
+            <a:pPr marL="457200" indent="-457200">
+              <a:buFont typeface="Arial" panose="020B0604020202020204" pitchFamily="34" charset="0"/>
+              <a:buChar char="•"/>
+            </a:pPr>
+            <a:endParaRPr lang="en-US" sz="3200" dirty="0"/>
+          </a:p>
+          <a:p>
+            <a:pPr marL="457200" indent="-457200">
+              <a:buFont typeface="Arial" panose="020B0604020202020204" pitchFamily="34" charset="0"/>
+              <a:buChar char="•"/>
+            </a:pPr>
+            <a:r>
+              <a:rPr lang="en-US" sz="3200" dirty="0" smtClean="0"/>
+              <a:t>Clean and prepare a data matrix for plotting</a:t>
+            </a:r>
+          </a:p>
+          <a:p>
+            <a:pPr marL="914400" lvl="1" indent="-457200">
+              <a:buFont typeface="Arial" panose="020B0604020202020204" pitchFamily="34" charset="0"/>
+              <a:buChar char="•"/>
+            </a:pPr>
+            <a:r>
+              <a:rPr lang="en-US" sz="3200" dirty="0" smtClean="0"/>
+              <a:t>Extract data from data frame, create data matrix</a:t>
+            </a:r>
+          </a:p>
+          <a:p>
+            <a:pPr marL="914400" lvl="1" indent="-457200">
+              <a:buFont typeface="Arial" panose="020B0604020202020204" pitchFamily="34" charset="0"/>
+              <a:buChar char="•"/>
+            </a:pPr>
+            <a:r>
+              <a:rPr lang="en-US" sz="3200" dirty="0" smtClean="0"/>
+              <a:t>Convert counts to percentages</a:t>
+            </a:r>
+          </a:p>
+          <a:p>
+            <a:pPr marL="914400" lvl="1" indent="-457200">
+              <a:buFont typeface="Arial" panose="020B0604020202020204" pitchFamily="34" charset="0"/>
+              <a:buChar char="•"/>
+            </a:pPr>
+            <a:r>
+              <a:rPr lang="en-US" sz="3200" dirty="0" smtClean="0"/>
+              <a:t>Ensure that matrix is rows=observations, columns=variables. Transpose as needed.</a:t>
+            </a:r>
+          </a:p>
+          <a:p>
+            <a:pPr marL="457200" indent="-457200">
+              <a:buFont typeface="Arial" panose="020B0604020202020204" pitchFamily="34" charset="0"/>
+              <a:buChar char="•"/>
+            </a:pPr>
+            <a:endParaRPr lang="en-US" sz="3200" dirty="0"/>
+          </a:p>
+          <a:p>
+            <a:pPr marL="457200" indent="-457200">
+              <a:buFont typeface="Arial" panose="020B0604020202020204" pitchFamily="34" charset="0"/>
+              <a:buChar char="•"/>
+            </a:pPr>
+            <a:r>
+              <a:rPr lang="en-US" sz="3200" dirty="0" smtClean="0"/>
+              <a:t>Plot data in Rioja (</a:t>
+            </a:r>
+            <a:r>
+              <a:rPr lang="en-US" sz="3200" dirty="0" err="1" smtClean="0">
+                <a:latin typeface="Courier New" panose="02070309020205020404" pitchFamily="49" charset="0"/>
+                <a:cs typeface="Courier New" panose="02070309020205020404" pitchFamily="49" charset="0"/>
+              </a:rPr>
+              <a:t>strat.plot</a:t>
+            </a:r>
+            <a:r>
+              <a:rPr lang="en-US" sz="3200" dirty="0" smtClean="0"/>
+              <a:t>)</a:t>
+            </a:r>
+            <a:endParaRPr lang="en-US" sz="3200" dirty="0"/>
+          </a:p>
+        </p:txBody>
+      </p:sp>
+    </p:spTree>
+    <p:extLst>
+      <p:ext uri="{BB962C8B-B14F-4D97-AF65-F5344CB8AC3E}">
+        <p14:creationId xmlns:p14="http://schemas.microsoft.com/office/powerpoint/2010/main" val="685478139"/>
       </p:ext>
     </p:extLst>
   </p:cSld>

</xml_diff>